<commit_message>
Informacja o graczu i wprowadziłem zmienną sleep
</commit_message>
<xml_diff>
--- a/TicTacToe.pptx
+++ b/TicTacToe.pptx
@@ -123,7 +123,7 @@
 <file path=ppt/revisionInfo.xml><?xml version="1.0" encoding="utf-8"?>
 <p1510:revInfo xmlns:a="http://schemas.openxmlformats.org/drawingml/2006/main" xmlns:r="http://schemas.openxmlformats.org/officeDocument/2006/relationships" xmlns:p1510="http://schemas.microsoft.com/office/powerpoint/2015/10/main">
   <p1510:revLst>
-    <p1510:client id="{0666559A-E6C0-004D-B1F4-A89D2561F001}" v="114" dt="2020-11-03T12:11:25.638"/>
+    <p1510:client id="{0666559A-E6C0-004D-B1F4-A89D2561F001}" v="115" dt="2020-11-03T23:30:08.668"/>
     <p1510:client id="{7EC88506-5735-47E4-B32C-1B94B328E889}" v="189" dt="2020-11-03T09:30:20.218"/>
     <p1510:client id="{B57C15AA-0BC2-4D8C-9DB6-8222A14E4091}" v="879" dt="2020-11-03T10:45:11.232"/>
   </p1510:revLst>
@@ -221,7 +221,7 @@
   <pc:docChgLst>
     <pc:chgData name="Kamil Trąba" userId="4547bd4dd1ae952a" providerId="LiveId" clId="{0666559A-E6C0-004D-B1F4-A89D2561F001}"/>
     <pc:docChg chg="undo custSel mod addSld delSld modSld addMainMaster delMainMaster">
-      <pc:chgData name="Kamil Trąba" userId="4547bd4dd1ae952a" providerId="LiveId" clId="{0666559A-E6C0-004D-B1F4-A89D2561F001}" dt="2020-11-03T12:15:01.531" v="990" actId="207"/>
+      <pc:chgData name="Kamil Trąba" userId="4547bd4dd1ae952a" providerId="LiveId" clId="{0666559A-E6C0-004D-B1F4-A89D2561F001}" dt="2020-11-03T23:30:08.666" v="993" actId="1076"/>
       <pc:docMkLst>
         <pc:docMk/>
       </pc:docMkLst>
@@ -531,7 +531,7 @@
         </pc:spChg>
       </pc:sldChg>
       <pc:sldChg chg="addSp modSp new mod">
-        <pc:chgData name="Kamil Trąba" userId="4547bd4dd1ae952a" providerId="LiveId" clId="{0666559A-E6C0-004D-B1F4-A89D2561F001}" dt="2020-11-03T12:11:25.637" v="951" actId="1076"/>
+        <pc:chgData name="Kamil Trąba" userId="4547bd4dd1ae952a" providerId="LiveId" clId="{0666559A-E6C0-004D-B1F4-A89D2561F001}" dt="2020-11-03T23:30:08.666" v="993" actId="1076"/>
         <pc:sldMkLst>
           <pc:docMk/>
           <pc:sldMk cId="716085031" sldId="264"/>
@@ -553,7 +553,7 @@
           </ac:spMkLst>
         </pc:spChg>
         <pc:spChg chg="add mod">
-          <ac:chgData name="Kamil Trąba" userId="4547bd4dd1ae952a" providerId="LiveId" clId="{0666559A-E6C0-004D-B1F4-A89D2561F001}" dt="2020-11-03T12:09:34.158" v="944" actId="1076"/>
+          <ac:chgData name="Kamil Trąba" userId="4547bd4dd1ae952a" providerId="LiveId" clId="{0666559A-E6C0-004D-B1F4-A89D2561F001}" dt="2020-11-03T23:29:53.381" v="992" actId="20577"/>
           <ac:spMkLst>
             <pc:docMk/>
             <pc:sldMk cId="716085031" sldId="264"/>
@@ -561,7 +561,7 @@
           </ac:spMkLst>
         </pc:spChg>
         <pc:picChg chg="add mod">
-          <ac:chgData name="Kamil Trąba" userId="4547bd4dd1ae952a" providerId="LiveId" clId="{0666559A-E6C0-004D-B1F4-A89D2561F001}" dt="2020-11-03T12:11:25.637" v="951" actId="1076"/>
+          <ac:chgData name="Kamil Trąba" userId="4547bd4dd1ae952a" providerId="LiveId" clId="{0666559A-E6C0-004D-B1F4-A89D2561F001}" dt="2020-11-03T23:30:08.666" v="993" actId="1076"/>
           <ac:picMkLst>
             <pc:docMk/>
             <pc:sldMk cId="716085031" sldId="264"/>
@@ -1676,7 +1676,7 @@
           <a:p>
             <a:fld id="{ED291B17-9318-49DB-B28B-6E5994AE9581}" type="datetime1">
               <a:rPr lang="en-US" smtClean="0"/>
-              <a:t>11/3/20</a:t>
+              <a:t>11/4/20</a:t>
             </a:fld>
             <a:endParaRPr lang="en-US" dirty="0"/>
           </a:p>
@@ -1879,7 +1879,7 @@
           <a:p>
             <a:fld id="{2CED4963-E985-44C4-B8C4-FDD613B7C2F8}" type="datetime1">
               <a:rPr lang="en-US" smtClean="0"/>
-              <a:t>11/3/20</a:t>
+              <a:t>11/4/20</a:t>
             </a:fld>
             <a:endParaRPr lang="en-US" dirty="0"/>
           </a:p>
@@ -2241,7 +2241,7 @@
           <a:p>
             <a:fld id="{ED291B17-9318-49DB-B28B-6E5994AE9581}" type="datetime1">
               <a:rPr lang="en-US" smtClean="0"/>
-              <a:t>11/3/20</a:t>
+              <a:t>11/4/20</a:t>
             </a:fld>
             <a:endParaRPr lang="en-US" dirty="0"/>
           </a:p>
@@ -2439,7 +2439,7 @@
           <a:p>
             <a:fld id="{78DD82B9-B8EE-4375-B6FF-88FA6ABB15D9}" type="datetime1">
               <a:rPr lang="en-US" smtClean="0"/>
-              <a:t>11/3/20</a:t>
+              <a:t>11/4/20</a:t>
             </a:fld>
             <a:endParaRPr lang="en-US" dirty="0"/>
           </a:p>
@@ -2751,7 +2751,7 @@
           <a:p>
             <a:fld id="{B2497495-0637-405E-AE64-5CC7506D51F5}" type="datetime1">
               <a:rPr lang="en-US" smtClean="0"/>
-              <a:t>11/3/20</a:t>
+              <a:t>11/4/20</a:t>
             </a:fld>
             <a:endParaRPr lang="en-US" dirty="0"/>
           </a:p>
@@ -3004,7 +3004,7 @@
           <a:p>
             <a:fld id="{7BFFD690-9426-415D-8B65-26881E07B2D4}" type="datetime1">
               <a:rPr lang="en-US" smtClean="0"/>
-              <a:t>11/3/20</a:t>
+              <a:t>11/4/20</a:t>
             </a:fld>
             <a:endParaRPr lang="en-US" dirty="0"/>
           </a:p>
@@ -3426,7 +3426,7 @@
           <a:p>
             <a:fld id="{04C4989A-474C-40DE-95B9-011C28B71673}" type="datetime1">
               <a:rPr lang="en-US" smtClean="0"/>
-              <a:t>11/3/20</a:t>
+              <a:t>11/4/20</a:t>
             </a:fld>
             <a:endParaRPr lang="en-US" dirty="0"/>
           </a:p>
@@ -3549,7 +3549,7 @@
           <a:p>
             <a:fld id="{5DB4ED54-5B5E-4A04-93D3-5772E3CE3818}" type="datetime1">
               <a:rPr lang="en-US" smtClean="0"/>
-              <a:t>11/3/20</a:t>
+              <a:t>11/4/20</a:t>
             </a:fld>
             <a:endParaRPr lang="en-US" dirty="0"/>
           </a:p>
@@ -3644,7 +3644,7 @@
           <a:p>
             <a:fld id="{4EDE50D6-574B-40AF-946F-D52A04ADE379}" type="datetime1">
               <a:rPr lang="en-US" smtClean="0"/>
-              <a:t>11/3/20</a:t>
+              <a:t>11/4/20</a:t>
             </a:fld>
             <a:endParaRPr lang="en-US" dirty="0"/>
           </a:p>
@@ -4021,7 +4021,7 @@
           <a:p>
             <a:fld id="{D82884F1-FFEA-405F-9602-3DCA865EDA4E}" type="datetime1">
               <a:rPr lang="en-US" smtClean="0"/>
-              <a:t>11/3/20</a:t>
+              <a:t>11/4/20</a:t>
             </a:fld>
             <a:endParaRPr lang="en-US" dirty="0"/>
           </a:p>
@@ -4314,7 +4314,7 @@
           <a:p>
             <a:fld id="{7E18DB4A-8810-4A10-AD5C-D5E2C667F5B3}" type="datetime1">
               <a:rPr lang="en-US" smtClean="0"/>
-              <a:t>11/3/20</a:t>
+              <a:t>11/4/20</a:t>
             </a:fld>
             <a:endParaRPr lang="en-US" dirty="0"/>
           </a:p>
@@ -4529,7 +4529,7 @@
           <a:p>
             <a:fld id="{ED291B17-9318-49DB-B28B-6E5994AE9581}" type="datetime1">
               <a:rPr lang="en-US" smtClean="0"/>
-              <a:t>11/3/20</a:t>
+              <a:t>11/4/20</a:t>
             </a:fld>
             <a:endParaRPr lang="en-US" dirty="0"/>
           </a:p>
@@ -5965,7 +5965,7 @@
                   <a:schemeClr val="bg1"/>
                 </a:solidFill>
               </a:rPr>
-              <a:t>268</a:t>
+              <a:t>281</a:t>
             </a:r>
           </a:p>
           <a:p>
@@ -6037,7 +6037,7 @@
         </p:blipFill>
         <p:spPr bwMode="auto">
           <a:xfrm>
-            <a:off x="7500551" y="3550775"/>
+            <a:off x="8269174" y="3550775"/>
             <a:ext cx="3305563" cy="2203708"/>
           </a:xfrm>
           <a:prstGeom prst="rect">

</xml_diff>

<commit_message>
Informacja o graczu i zmienna sleep
</commit_message>
<xml_diff>
--- a/TicTacToe.pptx
+++ b/TicTacToe.pptx
@@ -221,7 +221,7 @@
   <pc:docChgLst>
     <pc:chgData name="Kamil Trąba" userId="4547bd4dd1ae952a" providerId="LiveId" clId="{0666559A-E6C0-004D-B1F4-A89D2561F001}"/>
     <pc:docChg chg="undo custSel mod addSld delSld modSld addMainMaster delMainMaster">
-      <pc:chgData name="Kamil Trąba" userId="4547bd4dd1ae952a" providerId="LiveId" clId="{0666559A-E6C0-004D-B1F4-A89D2561F001}" dt="2020-11-03T23:30:08.666" v="993" actId="1076"/>
+      <pc:chgData name="Kamil Trąba" userId="4547bd4dd1ae952a" providerId="LiveId" clId="{0666559A-E6C0-004D-B1F4-A89D2561F001}" dt="2020-11-03T23:37:26.124" v="995" actId="20577"/>
       <pc:docMkLst>
         <pc:docMk/>
       </pc:docMkLst>
@@ -531,7 +531,7 @@
         </pc:spChg>
       </pc:sldChg>
       <pc:sldChg chg="addSp modSp new mod">
-        <pc:chgData name="Kamil Trąba" userId="4547bd4dd1ae952a" providerId="LiveId" clId="{0666559A-E6C0-004D-B1F4-A89D2561F001}" dt="2020-11-03T23:30:08.666" v="993" actId="1076"/>
+        <pc:chgData name="Kamil Trąba" userId="4547bd4dd1ae952a" providerId="LiveId" clId="{0666559A-E6C0-004D-B1F4-A89D2561F001}" dt="2020-11-03T23:37:26.124" v="995" actId="20577"/>
         <pc:sldMkLst>
           <pc:docMk/>
           <pc:sldMk cId="716085031" sldId="264"/>
@@ -553,7 +553,7 @@
           </ac:spMkLst>
         </pc:spChg>
         <pc:spChg chg="add mod">
-          <ac:chgData name="Kamil Trąba" userId="4547bd4dd1ae952a" providerId="LiveId" clId="{0666559A-E6C0-004D-B1F4-A89D2561F001}" dt="2020-11-03T23:29:53.381" v="992" actId="20577"/>
+          <ac:chgData name="Kamil Trąba" userId="4547bd4dd1ae952a" providerId="LiveId" clId="{0666559A-E6C0-004D-B1F4-A89D2561F001}" dt="2020-11-03T23:37:26.124" v="995" actId="20577"/>
           <ac:spMkLst>
             <pc:docMk/>
             <pc:sldMk cId="716085031" sldId="264"/>
@@ -5957,16 +5957,29 @@
                   <a:schemeClr val="bg1"/>
                 </a:solidFill>
               </a:rPr>
-              <a:t>Końcowa liczba linijek kodu: 	</a:t>
-            </a:r>
-            <a:r>
-              <a:rPr lang="pl-PL" sz="2800" b="1" dirty="0">
+              <a:t>Końcowa liczba linijek kodu: </a:t>
+            </a:r>
+            <a:r>
+              <a:rPr lang="pl-PL" sz="2800">
                 <a:solidFill>
                   <a:schemeClr val="bg1"/>
                 </a:solidFill>
               </a:rPr>
-              <a:t>281</a:t>
-            </a:r>
+              <a:t>	</a:t>
+            </a:r>
+            <a:r>
+              <a:rPr lang="pl-PL" sz="2800" b="1">
+                <a:solidFill>
+                  <a:schemeClr val="bg1"/>
+                </a:solidFill>
+              </a:rPr>
+              <a:t>280</a:t>
+            </a:r>
+            <a:endParaRPr lang="pl-PL" sz="2800" b="1" dirty="0">
+              <a:solidFill>
+                <a:schemeClr val="bg1"/>
+              </a:solidFill>
+            </a:endParaRPr>
           </a:p>
           <a:p>
             <a:endParaRPr lang="pl-PL" sz="2800" dirty="0">

</xml_diff>